<commit_message>
fix total page error
</commit_message>
<xml_diff>
--- a/idrl_ppt_theme.pptx
+++ b/idrl_ppt_theme.pptx
@@ -8,9 +8,9 @@
     <p:notesMasterId r:id="rId5"/>
   </p:notesMasterIdLst>
   <p:sldIdLst>
-    <p:sldId id="260" r:id="rId2"/>
-    <p:sldId id="259" r:id="rId3"/>
-    <p:sldId id="261" r:id="rId4"/>
+    <p:sldId id="256" r:id="rId2"/>
+    <p:sldId id="257" r:id="rId3"/>
+    <p:sldId id="258" r:id="rId4"/>
   </p:sldIdLst>
   <p:sldSz cx="12192000" cy="6858000"/>
   <p:notesSz cx="6858000" cy="9144000"/>
@@ -202,7 +202,7 @@
           <a:p>
             <a:fld id="{C7D04D0B-DF88-4777-9706-F91C537EE51B}" type="datetimeFigureOut">
               <a:rPr lang="zh-CN" altLang="en-US" smtClean="0"/>
-              <a:t>2020/3/26</a:t>
+              <a:t>2020/3/29</a:t>
             </a:fld>
             <a:endParaRPr lang="zh-CN" altLang="en-US"/>
           </a:p>
@@ -868,63 +868,6 @@
       </p:sp>
       <p:sp>
         <p:nvSpPr>
-          <p:cNvPr id="23" name="灯片编号占位符 5">
-            <a:extLst>
-              <a:ext uri="{FF2B5EF4-FFF2-40B4-BE49-F238E27FC236}">
-                <a16:creationId xmlns:a16="http://schemas.microsoft.com/office/drawing/2014/main" id="{841B85C9-7DA9-4E0A-BF35-287812D6F53B}"/>
-              </a:ext>
-            </a:extLst>
-          </p:cNvPr>
-          <p:cNvSpPr>
-            <a:spLocks noGrp="1"/>
-          </p:cNvSpPr>
-          <p:nvPr>
-            <p:ph type="sldNum" sz="quarter" idx="4"/>
-          </p:nvPr>
-        </p:nvSpPr>
-        <p:spPr>
-          <a:xfrm>
-            <a:off x="8654559" y="6567930"/>
-            <a:ext cx="2743200" cy="365125"/>
-          </a:xfrm>
-          <a:prstGeom prst="rect">
-            <a:avLst/>
-          </a:prstGeom>
-        </p:spPr>
-        <p:txBody>
-          <a:bodyPr vert="horz" lIns="91440" tIns="45720" rIns="91440" bIns="45720" rtlCol="0" anchor="ctr"/>
-          <a:lstStyle>
-            <a:lvl1pPr algn="r">
-              <a:defRPr sz="1200">
-                <a:solidFill>
-                  <a:schemeClr val="bg1"/>
-                </a:solidFill>
-              </a:defRPr>
-            </a:lvl1pPr>
-          </a:lstStyle>
-          <a:p>
-            <a:fld id="{1C6C2651-41E1-4DBC-AAE9-E12960D27CEC}" type="slidenum">
-              <a:rPr lang="zh-CN" altLang="en-US" smtClean="0"/>
-              <a:pPr/>
-              <a:t>‹#›</a:t>
-            </a:fld>
-            <a:r>
-              <a:rPr lang="zh-CN" altLang="en-US" dirty="0"/>
-              <a:t> </a:t>
-            </a:r>
-            <a:r>
-              <a:rPr lang="en-US" altLang="zh-CN" dirty="0"/>
-              <a:t>/ </a:t>
-            </a:r>
-            <a:r>
-              <a:rPr lang="zh-CN" altLang="en-US" dirty="0"/>
-              <a:t>总页数</a:t>
-            </a:r>
-          </a:p>
-        </p:txBody>
-      </p:sp>
-      <p:sp>
-        <p:nvSpPr>
           <p:cNvPr id="24" name="矩形 23">
             <a:extLst>
               <a:ext uri="{FF2B5EF4-FFF2-40B4-BE49-F238E27FC236}">
@@ -972,6 +915,60 @@
           <a:p>
             <a:pPr algn="ctr"/>
             <a:endParaRPr lang="zh-CN" altLang="en-US"/>
+          </a:p>
+        </p:txBody>
+      </p:sp>
+      <p:sp>
+        <p:nvSpPr>
+          <p:cNvPr id="8" name="灯片编号占位符 5">
+            <a:extLst>
+              <a:ext uri="{FF2B5EF4-FFF2-40B4-BE49-F238E27FC236}">
+                <a16:creationId xmlns:a16="http://schemas.microsoft.com/office/drawing/2014/main" id="{9F4BB2D3-8974-4C22-8B2D-AAD33A81F698}"/>
+              </a:ext>
+            </a:extLst>
+          </p:cNvPr>
+          <p:cNvSpPr>
+            <a:spLocks noGrp="1"/>
+          </p:cNvSpPr>
+          <p:nvPr>
+            <p:ph type="sldNum" sz="quarter" idx="4"/>
+          </p:nvPr>
+        </p:nvSpPr>
+        <p:spPr>
+          <a:xfrm>
+            <a:off x="8654559" y="6567930"/>
+            <a:ext cx="2743200" cy="365125"/>
+          </a:xfrm>
+          <a:prstGeom prst="rect">
+            <a:avLst/>
+          </a:prstGeom>
+        </p:spPr>
+        <p:txBody>
+          <a:bodyPr vert="horz" lIns="91440" tIns="45720" rIns="91440" bIns="45720" rtlCol="0" anchor="ctr"/>
+          <a:lstStyle>
+            <a:lvl1pPr algn="r">
+              <a:defRPr sz="1200">
+                <a:solidFill>
+                  <a:schemeClr val="bg1"/>
+                </a:solidFill>
+              </a:defRPr>
+            </a:lvl1pPr>
+          </a:lstStyle>
+          <a:p>
+            <a:fld id="{1C6C2651-41E1-4DBC-AAE9-E12960D27CEC}" type="slidenum">
+              <a:rPr lang="zh-CN" altLang="en-US" smtClean="0"/>
+              <a:pPr/>
+              <a:t>‹#›</a:t>
+            </a:fld>
+            <a:r>
+              <a:rPr lang="zh-CN" altLang="en-US" dirty="0"/>
+              <a:t>     </a:t>
+            </a:r>
+            <a:r>
+              <a:rPr lang="en-US" altLang="zh-CN" dirty="0"/>
+              <a:t>/</a:t>
+            </a:r>
+            <a:endParaRPr lang="zh-CN" altLang="en-US" dirty="0"/>
           </a:p>
         </p:txBody>
       </p:sp>
@@ -1147,10 +1144,10 @@
       </p:sp>
       <p:sp>
         <p:nvSpPr>
-          <p:cNvPr id="11" name="灯片编号占位符 5">
+          <p:cNvPr id="6" name="灯片编号占位符 5">
             <a:extLst>
               <a:ext uri="{FF2B5EF4-FFF2-40B4-BE49-F238E27FC236}">
-                <a16:creationId xmlns:a16="http://schemas.microsoft.com/office/drawing/2014/main" id="{1E8CE054-E62A-4283-A0F3-C0EB2E438DBF}"/>
+                <a16:creationId xmlns:a16="http://schemas.microsoft.com/office/drawing/2014/main" id="{40604DF5-8E2C-4F1C-A063-6D54D0FEFEB7}"/>
               </a:ext>
             </a:extLst>
           </p:cNvPr>
@@ -1189,16 +1186,13 @@
             </a:fld>
             <a:r>
               <a:rPr lang="zh-CN" altLang="en-US" dirty="0"/>
-              <a:t> </a:t>
+              <a:t>     </a:t>
             </a:r>
             <a:r>
               <a:rPr lang="en-US" altLang="zh-CN" dirty="0"/>
-              <a:t>/ </a:t>
-            </a:r>
-            <a:r>
-              <a:rPr lang="zh-CN" altLang="en-US" dirty="0"/>
-              <a:t>总页数</a:t>
-            </a:r>
+              <a:t>/</a:t>
+            </a:r>
+            <a:endParaRPr lang="zh-CN" altLang="en-US" dirty="0"/>
           </a:p>
         </p:txBody>
       </p:sp>
@@ -1470,10 +1464,10 @@
       </p:sp>
       <p:sp>
         <p:nvSpPr>
-          <p:cNvPr id="13" name="灯片编号占位符 5">
+          <p:cNvPr id="7" name="灯片编号占位符 5">
             <a:extLst>
               <a:ext uri="{FF2B5EF4-FFF2-40B4-BE49-F238E27FC236}">
-                <a16:creationId xmlns:a16="http://schemas.microsoft.com/office/drawing/2014/main" id="{556CB002-C653-49B9-811F-5A86C19DEC56}"/>
+                <a16:creationId xmlns:a16="http://schemas.microsoft.com/office/drawing/2014/main" id="{E25BB784-6A57-44A7-B7B6-4D683C898110}"/>
               </a:ext>
             </a:extLst>
           </p:cNvPr>
@@ -1512,16 +1506,13 @@
             </a:fld>
             <a:r>
               <a:rPr lang="zh-CN" altLang="en-US" dirty="0"/>
-              <a:t> </a:t>
+              <a:t>     </a:t>
             </a:r>
             <a:r>
               <a:rPr lang="en-US" altLang="zh-CN" dirty="0"/>
-              <a:t>/ </a:t>
-            </a:r>
-            <a:r>
-              <a:rPr lang="zh-CN" altLang="en-US" dirty="0"/>
-              <a:t>总页数</a:t>
-            </a:r>
+              <a:t>/</a:t>
+            </a:r>
+            <a:endParaRPr lang="zh-CN" altLang="en-US" dirty="0"/>
           </a:p>
         </p:txBody>
       </p:sp>
@@ -2189,10 +2180,10 @@
       </p:sp>
       <p:sp>
         <p:nvSpPr>
-          <p:cNvPr id="62" name="灯片编号占位符 5">
+          <p:cNvPr id="7" name="灯片编号占位符 5">
             <a:extLst>
               <a:ext uri="{FF2B5EF4-FFF2-40B4-BE49-F238E27FC236}">
-                <a16:creationId xmlns:a16="http://schemas.microsoft.com/office/drawing/2014/main" id="{4E171218-D18F-4E87-9074-3260AE28A304}"/>
+                <a16:creationId xmlns:a16="http://schemas.microsoft.com/office/drawing/2014/main" id="{4528959A-10A0-4281-BD8E-269DD9A56C66}"/>
               </a:ext>
             </a:extLst>
           </p:cNvPr>
@@ -2231,14 +2222,208 @@
             </a:fld>
             <a:r>
               <a:rPr lang="zh-CN" altLang="en-US" dirty="0"/>
-              <a:t>  </a:t>
+              <a:t>     </a:t>
             </a:r>
             <a:r>
               <a:rPr lang="en-US" altLang="zh-CN" dirty="0"/>
-              <a:t>/ </a:t>
-            </a:r>
-            <a:r>
-              <a:rPr lang="zh-CN" altLang="en-US" dirty="0"/>
+              <a:t>/</a:t>
+            </a:r>
+            <a:endParaRPr lang="zh-CN" altLang="en-US" dirty="0"/>
+          </a:p>
+        </p:txBody>
+      </p:sp>
+      <p:sp>
+        <p:nvSpPr>
+          <p:cNvPr id="8" name="文本占位符 15">
+            <a:extLst>
+              <a:ext uri="{FF2B5EF4-FFF2-40B4-BE49-F238E27FC236}">
+                <a16:creationId xmlns:a16="http://schemas.microsoft.com/office/drawing/2014/main" id="{D3E6EA1E-D6D0-42EC-B7CB-A89FBBDE137F}"/>
+              </a:ext>
+            </a:extLst>
+          </p:cNvPr>
+          <p:cNvSpPr txBox="1">
+            <a:spLocks/>
+          </p:cNvSpPr>
+          <p:nvPr userDrawn="1"/>
+        </p:nvSpPr>
+        <p:spPr>
+          <a:xfrm>
+            <a:off x="11415343" y="6625401"/>
+            <a:ext cx="852854" cy="215014"/>
+          </a:xfrm>
+          <a:prstGeom prst="rect">
+            <a:avLst/>
+          </a:prstGeom>
+        </p:spPr>
+        <p:txBody>
+          <a:bodyPr/>
+          <a:lstStyle>
+            <a:lvl1pPr marL="0" indent="0" algn="l" defTabSz="914400" rtl="0" eaLnBrk="1" latinLnBrk="0" hangingPunct="1">
+              <a:lnSpc>
+                <a:spcPct val="90000"/>
+              </a:lnSpc>
+              <a:spcBef>
+                <a:spcPts val="1000"/>
+              </a:spcBef>
+              <a:buFont typeface="Arial" panose="020B0604020202020204" pitchFamily="34" charset="0"/>
+              <a:buNone/>
+              <a:defRPr sz="1050" kern="1200">
+                <a:solidFill>
+                  <a:schemeClr val="bg1"/>
+                </a:solidFill>
+                <a:latin typeface="+mn-lt"/>
+                <a:ea typeface="+mn-ea"/>
+                <a:cs typeface="+mn-cs"/>
+              </a:defRPr>
+            </a:lvl1pPr>
+            <a:lvl2pPr marL="685800" indent="-228600" algn="l" defTabSz="914400" rtl="0" eaLnBrk="1" latinLnBrk="0" hangingPunct="1">
+              <a:lnSpc>
+                <a:spcPct val="90000"/>
+              </a:lnSpc>
+              <a:spcBef>
+                <a:spcPts val="500"/>
+              </a:spcBef>
+              <a:buFont typeface="Arial" panose="020B0604020202020204" pitchFamily="34" charset="0"/>
+              <a:buChar char="•"/>
+              <a:defRPr sz="2400" kern="1200">
+                <a:solidFill>
+                  <a:schemeClr val="tx1"/>
+                </a:solidFill>
+                <a:latin typeface="+mn-lt"/>
+                <a:ea typeface="+mn-ea"/>
+                <a:cs typeface="+mn-cs"/>
+              </a:defRPr>
+            </a:lvl2pPr>
+            <a:lvl3pPr marL="1143000" indent="-228600" algn="l" defTabSz="914400" rtl="0" eaLnBrk="1" latinLnBrk="0" hangingPunct="1">
+              <a:lnSpc>
+                <a:spcPct val="90000"/>
+              </a:lnSpc>
+              <a:spcBef>
+                <a:spcPts val="500"/>
+              </a:spcBef>
+              <a:buFont typeface="Arial" panose="020B0604020202020204" pitchFamily="34" charset="0"/>
+              <a:buChar char="•"/>
+              <a:defRPr sz="2000" kern="1200">
+                <a:solidFill>
+                  <a:schemeClr val="tx1"/>
+                </a:solidFill>
+                <a:latin typeface="+mn-lt"/>
+                <a:ea typeface="+mn-ea"/>
+                <a:cs typeface="+mn-cs"/>
+              </a:defRPr>
+            </a:lvl3pPr>
+            <a:lvl4pPr marL="1600200" indent="-228600" algn="l" defTabSz="914400" rtl="0" eaLnBrk="1" latinLnBrk="0" hangingPunct="1">
+              <a:lnSpc>
+                <a:spcPct val="90000"/>
+              </a:lnSpc>
+              <a:spcBef>
+                <a:spcPts val="500"/>
+              </a:spcBef>
+              <a:buFont typeface="Arial" panose="020B0604020202020204" pitchFamily="34" charset="0"/>
+              <a:buChar char="•"/>
+              <a:defRPr sz="1800" kern="1200">
+                <a:solidFill>
+                  <a:schemeClr val="tx1"/>
+                </a:solidFill>
+                <a:latin typeface="+mn-lt"/>
+                <a:ea typeface="+mn-ea"/>
+                <a:cs typeface="+mn-cs"/>
+              </a:defRPr>
+            </a:lvl4pPr>
+            <a:lvl5pPr marL="2057400" indent="-228600" algn="l" defTabSz="914400" rtl="0" eaLnBrk="1" latinLnBrk="0" hangingPunct="1">
+              <a:lnSpc>
+                <a:spcPct val="90000"/>
+              </a:lnSpc>
+              <a:spcBef>
+                <a:spcPts val="500"/>
+              </a:spcBef>
+              <a:buFont typeface="Arial" panose="020B0604020202020204" pitchFamily="34" charset="0"/>
+              <a:buChar char="•"/>
+              <a:defRPr sz="1800" kern="1200">
+                <a:solidFill>
+                  <a:schemeClr val="tx1"/>
+                </a:solidFill>
+                <a:latin typeface="+mn-lt"/>
+                <a:ea typeface="+mn-ea"/>
+                <a:cs typeface="+mn-cs"/>
+              </a:defRPr>
+            </a:lvl5pPr>
+            <a:lvl6pPr marL="2514600" indent="-228600" algn="l" defTabSz="914400" rtl="0" eaLnBrk="1" latinLnBrk="0" hangingPunct="1">
+              <a:lnSpc>
+                <a:spcPct val="90000"/>
+              </a:lnSpc>
+              <a:spcBef>
+                <a:spcPts val="500"/>
+              </a:spcBef>
+              <a:buFont typeface="Arial" panose="020B0604020202020204" pitchFamily="34" charset="0"/>
+              <a:buChar char="•"/>
+              <a:defRPr sz="1800" kern="1200">
+                <a:solidFill>
+                  <a:schemeClr val="tx1"/>
+                </a:solidFill>
+                <a:latin typeface="+mn-lt"/>
+                <a:ea typeface="+mn-ea"/>
+                <a:cs typeface="+mn-cs"/>
+              </a:defRPr>
+            </a:lvl6pPr>
+            <a:lvl7pPr marL="2971800" indent="-228600" algn="l" defTabSz="914400" rtl="0" eaLnBrk="1" latinLnBrk="0" hangingPunct="1">
+              <a:lnSpc>
+                <a:spcPct val="90000"/>
+              </a:lnSpc>
+              <a:spcBef>
+                <a:spcPts val="500"/>
+              </a:spcBef>
+              <a:buFont typeface="Arial" panose="020B0604020202020204" pitchFamily="34" charset="0"/>
+              <a:buChar char="•"/>
+              <a:defRPr sz="1800" kern="1200">
+                <a:solidFill>
+                  <a:schemeClr val="tx1"/>
+                </a:solidFill>
+                <a:latin typeface="+mn-lt"/>
+                <a:ea typeface="+mn-ea"/>
+                <a:cs typeface="+mn-cs"/>
+              </a:defRPr>
+            </a:lvl7pPr>
+            <a:lvl8pPr marL="3429000" indent="-228600" algn="l" defTabSz="914400" rtl="0" eaLnBrk="1" latinLnBrk="0" hangingPunct="1">
+              <a:lnSpc>
+                <a:spcPct val="90000"/>
+              </a:lnSpc>
+              <a:spcBef>
+                <a:spcPts val="500"/>
+              </a:spcBef>
+              <a:buFont typeface="Arial" panose="020B0604020202020204" pitchFamily="34" charset="0"/>
+              <a:buChar char="•"/>
+              <a:defRPr sz="1800" kern="1200">
+                <a:solidFill>
+                  <a:schemeClr val="tx1"/>
+                </a:solidFill>
+                <a:latin typeface="+mn-lt"/>
+                <a:ea typeface="+mn-ea"/>
+                <a:cs typeface="+mn-cs"/>
+              </a:defRPr>
+            </a:lvl8pPr>
+            <a:lvl9pPr marL="3886200" indent="-228600" algn="l" defTabSz="914400" rtl="0" eaLnBrk="1" latinLnBrk="0" hangingPunct="1">
+              <a:lnSpc>
+                <a:spcPct val="90000"/>
+              </a:lnSpc>
+              <a:spcBef>
+                <a:spcPts val="500"/>
+              </a:spcBef>
+              <a:buFont typeface="Arial" panose="020B0604020202020204" pitchFamily="34" charset="0"/>
+              <a:buChar char="•"/>
+              <a:defRPr sz="1800" kern="1200">
+                <a:solidFill>
+                  <a:schemeClr val="tx1"/>
+                </a:solidFill>
+                <a:latin typeface="+mn-lt"/>
+                <a:ea typeface="+mn-ea"/>
+                <a:cs typeface="+mn-cs"/>
+              </a:defRPr>
+            </a:lvl9pPr>
+          </a:lstStyle>
+          <a:p>
+            <a:r>
+              <a:rPr lang="zh-CN" altLang="en-US" sz="1200" dirty="0"/>
               <a:t>总页数</a:t>
             </a:r>
           </a:p>
@@ -2563,7 +2748,7 @@
           <p:cNvPr id="2" name="标题 1">
             <a:extLst>
               <a:ext uri="{FF2B5EF4-FFF2-40B4-BE49-F238E27FC236}">
-                <a16:creationId xmlns:a16="http://schemas.microsoft.com/office/drawing/2014/main" id="{9366FFAB-632E-461D-8EC3-E2A3689F7407}"/>
+                <a16:creationId xmlns:a16="http://schemas.microsoft.com/office/drawing/2014/main" id="{DAAB0F33-654A-4B6F-9F2F-FCA96D006D48}"/>
               </a:ext>
             </a:extLst>
           </p:cNvPr>
@@ -2579,10 +2764,7 @@
           <a:bodyPr/>
           <a:lstStyle/>
           <a:p>
-            <a:r>
-              <a:rPr lang="zh-CN" altLang="en-US" dirty="0"/>
-              <a:t>报告题目</a:t>
-            </a:r>
+            <a:endParaRPr lang="zh-CN" altLang="en-US"/>
           </a:p>
         </p:txBody>
       </p:sp>
@@ -2591,7 +2773,7 @@
           <p:cNvPr id="3" name="副标题 2">
             <a:extLst>
               <a:ext uri="{FF2B5EF4-FFF2-40B4-BE49-F238E27FC236}">
-                <a16:creationId xmlns:a16="http://schemas.microsoft.com/office/drawing/2014/main" id="{02467DB9-2B38-46EF-AF21-C6FAC337CCFA}"/>
+                <a16:creationId xmlns:a16="http://schemas.microsoft.com/office/drawing/2014/main" id="{07FAA162-9294-4D71-A84F-58AA82D91AB4}"/>
               </a:ext>
             </a:extLst>
           </p:cNvPr>
@@ -2607,10 +2789,7 @@
           <a:bodyPr/>
           <a:lstStyle/>
           <a:p>
-            <a:r>
-              <a:rPr lang="zh-CN" altLang="en-US" dirty="0"/>
-              <a:t>周炜恩</a:t>
-            </a:r>
+            <a:endParaRPr lang="zh-CN" altLang="en-US"/>
           </a:p>
         </p:txBody>
       </p:sp>
@@ -2619,7 +2798,7 @@
           <p:cNvPr id="4" name="文本占位符 3">
             <a:extLst>
               <a:ext uri="{FF2B5EF4-FFF2-40B4-BE49-F238E27FC236}">
-                <a16:creationId xmlns:a16="http://schemas.microsoft.com/office/drawing/2014/main" id="{2A1E20DB-045C-4E8A-9069-DFA15DEC729D}"/>
+                <a16:creationId xmlns:a16="http://schemas.microsoft.com/office/drawing/2014/main" id="{0A84F555-4EF4-448A-A98D-779B963AB7EF}"/>
               </a:ext>
             </a:extLst>
           </p:cNvPr>
@@ -2635,30 +2814,7 @@
           <a:bodyPr/>
           <a:lstStyle/>
           <a:p>
-            <a:r>
-              <a:rPr lang="en-US" altLang="zh-CN" dirty="0"/>
-              <a:t>2020</a:t>
-            </a:r>
-            <a:r>
-              <a:rPr lang="zh-CN" altLang="en-US" dirty="0"/>
-              <a:t>年</a:t>
-            </a:r>
-            <a:r>
-              <a:rPr lang="en-US" altLang="zh-CN" dirty="0"/>
-              <a:t>3</a:t>
-            </a:r>
-            <a:r>
-              <a:rPr lang="zh-CN" altLang="en-US" dirty="0"/>
-              <a:t>月</a:t>
-            </a:r>
-            <a:r>
-              <a:rPr lang="en-US" altLang="zh-CN" dirty="0"/>
-              <a:t>25</a:t>
-            </a:r>
-            <a:r>
-              <a:rPr lang="zh-CN" altLang="en-US" dirty="0"/>
-              <a:t>日</a:t>
-            </a:r>
+            <a:endParaRPr lang="zh-CN" altLang="en-US"/>
           </a:p>
         </p:txBody>
       </p:sp>
@@ -2667,7 +2823,7 @@
           <p:cNvPr id="5" name="灯片编号占位符 4">
             <a:extLst>
               <a:ext uri="{FF2B5EF4-FFF2-40B4-BE49-F238E27FC236}">
-                <a16:creationId xmlns:a16="http://schemas.microsoft.com/office/drawing/2014/main" id="{CAD0F94E-328A-4DEA-B4D0-A754045DB6D8}"/>
+                <a16:creationId xmlns:a16="http://schemas.microsoft.com/office/drawing/2014/main" id="{9E80B809-E844-43BA-B8E2-2A89C15C6C0C}"/>
               </a:ext>
             </a:extLst>
           </p:cNvPr>
@@ -2690,15 +2846,11 @@
             </a:fld>
             <a:r>
               <a:rPr lang="zh-CN" altLang="en-US"/>
-              <a:t> </a:t>
+              <a:t>     </a:t>
             </a:r>
             <a:r>
               <a:rPr lang="en-US" altLang="zh-CN"/>
-              <a:t>/ </a:t>
-            </a:r>
-            <a:r>
-              <a:rPr lang="zh-CN" altLang="en-US"/>
-              <a:t>总页数</a:t>
+              <a:t>/</a:t>
             </a:r>
             <a:endParaRPr lang="zh-CN" altLang="en-US" dirty="0"/>
           </a:p>
@@ -2707,7 +2859,7 @@
     </p:spTree>
     <p:extLst>
       <p:ext uri="{BB962C8B-B14F-4D97-AF65-F5344CB8AC3E}">
-        <p14:creationId xmlns:p14="http://schemas.microsoft.com/office/powerpoint/2010/main" val="606177293"/>
+        <p14:creationId xmlns:p14="http://schemas.microsoft.com/office/powerpoint/2010/main" val="2199820298"/>
       </p:ext>
     </p:extLst>
   </p:cSld>
@@ -2739,7 +2891,7 @@
           <p:cNvPr id="2" name="标题 1">
             <a:extLst>
               <a:ext uri="{FF2B5EF4-FFF2-40B4-BE49-F238E27FC236}">
-                <a16:creationId xmlns:a16="http://schemas.microsoft.com/office/drawing/2014/main" id="{851064FA-E63D-4635-966D-2961E04C444C}"/>
+                <a16:creationId xmlns:a16="http://schemas.microsoft.com/office/drawing/2014/main" id="{B1525B27-7B82-4948-A9CE-8F0C4EE7B72C}"/>
               </a:ext>
             </a:extLst>
           </p:cNvPr>
@@ -2755,10 +2907,7 @@
           <a:bodyPr/>
           <a:lstStyle/>
           <a:p>
-            <a:r>
-              <a:rPr lang="zh-CN" altLang="en-US" dirty="0"/>
-              <a:t>标题 单栏</a:t>
-            </a:r>
+            <a:endParaRPr lang="zh-CN" altLang="en-US"/>
           </a:p>
         </p:txBody>
       </p:sp>
@@ -2767,7 +2916,7 @@
           <p:cNvPr id="3" name="内容占位符 2">
             <a:extLst>
               <a:ext uri="{FF2B5EF4-FFF2-40B4-BE49-F238E27FC236}">
-                <a16:creationId xmlns:a16="http://schemas.microsoft.com/office/drawing/2014/main" id="{6A32B782-5949-45E6-BD37-2D8464979C5E}"/>
+                <a16:creationId xmlns:a16="http://schemas.microsoft.com/office/drawing/2014/main" id="{8B25475C-CA44-4205-A632-D15CF6972EE4}"/>
               </a:ext>
             </a:extLst>
           </p:cNvPr>
@@ -2783,63 +2932,7 @@
           <a:bodyPr/>
           <a:lstStyle/>
           <a:p>
-            <a:r>
-              <a:rPr lang="zh-CN" altLang="en-US" dirty="0"/>
-              <a:t>内容一</a:t>
-            </a:r>
-            <a:endParaRPr lang="en-US" altLang="zh-CN" dirty="0"/>
-          </a:p>
-          <a:p>
-            <a:r>
-              <a:rPr lang="zh-CN" altLang="en-US" dirty="0"/>
-              <a:t>内容二</a:t>
-            </a:r>
-            <a:endParaRPr lang="en-US" altLang="zh-CN" dirty="0"/>
-          </a:p>
-          <a:p>
-            <a:pPr lvl="1"/>
-            <a:r>
-              <a:rPr lang="zh-CN" altLang="en-US" dirty="0"/>
-              <a:t>内容 </a:t>
-            </a:r>
-            <a:r>
-              <a:rPr lang="en-US" altLang="zh-CN" dirty="0"/>
-              <a:t>1</a:t>
-            </a:r>
-          </a:p>
-          <a:p>
-            <a:pPr lvl="1"/>
-            <a:r>
-              <a:rPr lang="zh-CN" altLang="en-US" dirty="0"/>
-              <a:t>内容 </a:t>
-            </a:r>
-            <a:r>
-              <a:rPr lang="en-US" altLang="zh-CN" dirty="0"/>
-              <a:t>2</a:t>
-            </a:r>
-          </a:p>
-          <a:p>
-            <a:pPr lvl="2"/>
-            <a:r>
-              <a:rPr lang="zh-CN" altLang="en-US" dirty="0"/>
-              <a:t>内容 </a:t>
-            </a:r>
-            <a:r>
-              <a:rPr lang="en-US" altLang="zh-CN" dirty="0"/>
-              <a:t>a</a:t>
-            </a:r>
-          </a:p>
-          <a:p>
-            <a:pPr lvl="2"/>
-            <a:r>
-              <a:rPr lang="zh-CN" altLang="en-US" dirty="0"/>
-              <a:t>内容 </a:t>
-            </a:r>
-            <a:r>
-              <a:rPr lang="en-US" altLang="zh-CN" dirty="0"/>
-              <a:t>b</a:t>
-            </a:r>
-            <a:endParaRPr lang="zh-CN" altLang="en-US" dirty="0"/>
+            <a:endParaRPr lang="zh-CN" altLang="en-US"/>
           </a:p>
         </p:txBody>
       </p:sp>
@@ -2848,7 +2941,7 @@
           <p:cNvPr id="4" name="灯片编号占位符 3">
             <a:extLst>
               <a:ext uri="{FF2B5EF4-FFF2-40B4-BE49-F238E27FC236}">
-                <a16:creationId xmlns:a16="http://schemas.microsoft.com/office/drawing/2014/main" id="{14CFE36D-AD08-4839-BB62-05D2474CDFF4}"/>
+                <a16:creationId xmlns:a16="http://schemas.microsoft.com/office/drawing/2014/main" id="{3571C72C-77E1-4FB2-ADDE-C54E781329DC}"/>
               </a:ext>
             </a:extLst>
           </p:cNvPr>
@@ -2871,15 +2964,11 @@
             </a:fld>
             <a:r>
               <a:rPr lang="zh-CN" altLang="en-US"/>
-              <a:t> </a:t>
+              <a:t>     </a:t>
             </a:r>
             <a:r>
               <a:rPr lang="en-US" altLang="zh-CN"/>
-              <a:t>/ </a:t>
-            </a:r>
-            <a:r>
-              <a:rPr lang="zh-CN" altLang="en-US"/>
-              <a:t>总页数</a:t>
+              <a:t>/</a:t>
             </a:r>
             <a:endParaRPr lang="zh-CN" altLang="en-US" dirty="0"/>
           </a:p>
@@ -2888,7 +2977,7 @@
     </p:spTree>
     <p:extLst>
       <p:ext uri="{BB962C8B-B14F-4D97-AF65-F5344CB8AC3E}">
-        <p14:creationId xmlns:p14="http://schemas.microsoft.com/office/powerpoint/2010/main" val="1296001720"/>
+        <p14:creationId xmlns:p14="http://schemas.microsoft.com/office/powerpoint/2010/main" val="859369879"/>
       </p:ext>
     </p:extLst>
   </p:cSld>
@@ -2920,7 +3009,7 @@
           <p:cNvPr id="2" name="内容占位符 1">
             <a:extLst>
               <a:ext uri="{FF2B5EF4-FFF2-40B4-BE49-F238E27FC236}">
-                <a16:creationId xmlns:a16="http://schemas.microsoft.com/office/drawing/2014/main" id="{9B9E860F-196E-4707-9387-AAEC5D7A48C9}"/>
+                <a16:creationId xmlns:a16="http://schemas.microsoft.com/office/drawing/2014/main" id="{F5D32FF1-00D8-498A-8F9F-2DBBE6C9DDDA}"/>
               </a:ext>
             </a:extLst>
           </p:cNvPr>
@@ -2936,66 +3025,7 @@
           <a:bodyPr/>
           <a:lstStyle/>
           <a:p>
-            <a:r>
-              <a:rPr lang="zh-CN" altLang="en-US" dirty="0"/>
-              <a:t>内容一</a:t>
-            </a:r>
-            <a:endParaRPr lang="en-US" altLang="zh-CN" dirty="0"/>
-          </a:p>
-          <a:p>
-            <a:r>
-              <a:rPr lang="zh-CN" altLang="en-US" dirty="0"/>
-              <a:t>内容二</a:t>
-            </a:r>
-            <a:endParaRPr lang="en-US" altLang="zh-CN" dirty="0"/>
-          </a:p>
-          <a:p>
-            <a:pPr lvl="1"/>
-            <a:r>
-              <a:rPr lang="zh-CN" altLang="en-US" dirty="0"/>
-              <a:t>内容 </a:t>
-            </a:r>
-            <a:r>
-              <a:rPr lang="en-US" altLang="zh-CN" dirty="0"/>
-              <a:t>1</a:t>
-            </a:r>
-          </a:p>
-          <a:p>
-            <a:pPr lvl="1"/>
-            <a:r>
-              <a:rPr lang="zh-CN" altLang="en-US" dirty="0"/>
-              <a:t>内容 </a:t>
-            </a:r>
-            <a:r>
-              <a:rPr lang="en-US" altLang="zh-CN" dirty="0"/>
-              <a:t>2</a:t>
-            </a:r>
-          </a:p>
-          <a:p>
-            <a:pPr lvl="2"/>
-            <a:r>
-              <a:rPr lang="zh-CN" altLang="en-US" dirty="0"/>
-              <a:t>内容 </a:t>
-            </a:r>
-            <a:r>
-              <a:rPr lang="en-US" altLang="zh-CN" dirty="0"/>
-              <a:t>a</a:t>
-            </a:r>
-          </a:p>
-          <a:p>
-            <a:pPr lvl="2"/>
-            <a:r>
-              <a:rPr lang="zh-CN" altLang="en-US" dirty="0"/>
-              <a:t>内容 </a:t>
-            </a:r>
-            <a:r>
-              <a:rPr lang="en-US" altLang="zh-CN" dirty="0"/>
-              <a:t>b</a:t>
-            </a:r>
-            <a:endParaRPr lang="zh-CN" altLang="en-US" dirty="0"/>
-          </a:p>
-          <a:p>
-            <a:endParaRPr lang="zh-CN" altLang="en-US" dirty="0"/>
+            <a:endParaRPr lang="zh-CN" altLang="en-US"/>
           </a:p>
         </p:txBody>
       </p:sp>
@@ -3004,7 +3034,7 @@
           <p:cNvPr id="3" name="内容占位符 2">
             <a:extLst>
               <a:ext uri="{FF2B5EF4-FFF2-40B4-BE49-F238E27FC236}">
-                <a16:creationId xmlns:a16="http://schemas.microsoft.com/office/drawing/2014/main" id="{0C19B6C7-BD25-4AA9-A35B-DBBB7A6CFC00}"/>
+                <a16:creationId xmlns:a16="http://schemas.microsoft.com/office/drawing/2014/main" id="{C1AC8C0B-D583-4156-85F3-F7DA14D89471}"/>
               </a:ext>
             </a:extLst>
           </p:cNvPr>
@@ -3020,66 +3050,7 @@
           <a:bodyPr/>
           <a:lstStyle/>
           <a:p>
-            <a:r>
-              <a:rPr lang="zh-CN" altLang="en-US" dirty="0"/>
-              <a:t>内容一</a:t>
-            </a:r>
-            <a:endParaRPr lang="en-US" altLang="zh-CN" dirty="0"/>
-          </a:p>
-          <a:p>
-            <a:r>
-              <a:rPr lang="zh-CN" altLang="en-US" dirty="0"/>
-              <a:t>内容二</a:t>
-            </a:r>
-            <a:endParaRPr lang="en-US" altLang="zh-CN" dirty="0"/>
-          </a:p>
-          <a:p>
-            <a:pPr lvl="1"/>
-            <a:r>
-              <a:rPr lang="zh-CN" altLang="en-US" dirty="0"/>
-              <a:t>内容 </a:t>
-            </a:r>
-            <a:r>
-              <a:rPr lang="en-US" altLang="zh-CN" dirty="0"/>
-              <a:t>1</a:t>
-            </a:r>
-          </a:p>
-          <a:p>
-            <a:pPr lvl="1"/>
-            <a:r>
-              <a:rPr lang="zh-CN" altLang="en-US" dirty="0"/>
-              <a:t>内容 </a:t>
-            </a:r>
-            <a:r>
-              <a:rPr lang="en-US" altLang="zh-CN" dirty="0"/>
-              <a:t>2</a:t>
-            </a:r>
-          </a:p>
-          <a:p>
-            <a:pPr lvl="2"/>
-            <a:r>
-              <a:rPr lang="zh-CN" altLang="en-US" dirty="0"/>
-              <a:t>内容 </a:t>
-            </a:r>
-            <a:r>
-              <a:rPr lang="en-US" altLang="zh-CN" dirty="0"/>
-              <a:t>a</a:t>
-            </a:r>
-          </a:p>
-          <a:p>
-            <a:pPr lvl="2"/>
-            <a:r>
-              <a:rPr lang="zh-CN" altLang="en-US" dirty="0"/>
-              <a:t>内容 </a:t>
-            </a:r>
-            <a:r>
-              <a:rPr lang="en-US" altLang="zh-CN" dirty="0"/>
-              <a:t>b</a:t>
-            </a:r>
-            <a:endParaRPr lang="zh-CN" altLang="en-US" dirty="0"/>
-          </a:p>
-          <a:p>
-            <a:endParaRPr lang="zh-CN" altLang="en-US" dirty="0"/>
+            <a:endParaRPr lang="zh-CN" altLang="en-US"/>
           </a:p>
         </p:txBody>
       </p:sp>
@@ -3088,7 +3059,7 @@
           <p:cNvPr id="4" name="标题 3">
             <a:extLst>
               <a:ext uri="{FF2B5EF4-FFF2-40B4-BE49-F238E27FC236}">
-                <a16:creationId xmlns:a16="http://schemas.microsoft.com/office/drawing/2014/main" id="{5609427B-968B-4D44-A742-EBED5B9BEE0D}"/>
+                <a16:creationId xmlns:a16="http://schemas.microsoft.com/office/drawing/2014/main" id="{52F31D8F-437C-47E8-AF73-C629C00A729E}"/>
               </a:ext>
             </a:extLst>
           </p:cNvPr>
@@ -3104,10 +3075,7 @@
           <a:bodyPr/>
           <a:lstStyle/>
           <a:p>
-            <a:r>
-              <a:rPr lang="zh-CN" altLang="en-US" dirty="0"/>
-              <a:t>标题 双栏</a:t>
-            </a:r>
+            <a:endParaRPr lang="zh-CN" altLang="en-US"/>
           </a:p>
         </p:txBody>
       </p:sp>
@@ -3116,7 +3084,7 @@
           <p:cNvPr id="5" name="灯片编号占位符 4">
             <a:extLst>
               <a:ext uri="{FF2B5EF4-FFF2-40B4-BE49-F238E27FC236}">
-                <a16:creationId xmlns:a16="http://schemas.microsoft.com/office/drawing/2014/main" id="{7588D69E-391A-422A-A6FD-FB874B923270}"/>
+                <a16:creationId xmlns:a16="http://schemas.microsoft.com/office/drawing/2014/main" id="{B00EFC1E-80EA-4E9F-9B77-88D1E4D61A28}"/>
               </a:ext>
             </a:extLst>
           </p:cNvPr>
@@ -3139,15 +3107,11 @@
             </a:fld>
             <a:r>
               <a:rPr lang="zh-CN" altLang="en-US"/>
-              <a:t> </a:t>
+              <a:t>     </a:t>
             </a:r>
             <a:r>
               <a:rPr lang="en-US" altLang="zh-CN"/>
-              <a:t>/ </a:t>
-            </a:r>
-            <a:r>
-              <a:rPr lang="zh-CN" altLang="en-US"/>
-              <a:t>总页数</a:t>
+              <a:t>/</a:t>
             </a:r>
             <a:endParaRPr lang="zh-CN" altLang="en-US" dirty="0"/>
           </a:p>
@@ -3156,7 +3120,7 @@
     </p:spTree>
     <p:extLst>
       <p:ext uri="{BB962C8B-B14F-4D97-AF65-F5344CB8AC3E}">
-        <p14:creationId xmlns:p14="http://schemas.microsoft.com/office/powerpoint/2010/main" val="3402535236"/>
+        <p14:creationId xmlns:p14="http://schemas.microsoft.com/office/powerpoint/2010/main" val="1507230444"/>
       </p:ext>
     </p:extLst>
   </p:cSld>

</xml_diff>